<commit_message>
UP/Down Icons korrigiert: alle haben selbe Größe.
</commit_message>
<xml_diff>
--- a/img/ButtonStates.pptx
+++ b/img/ButtonStates.pptx
@@ -288,7 +288,7 @@
           <a:p>
             <a:fld id="{AC60435C-27D0-4975-B58B-066C710F2018}" type="datetimeFigureOut">
               <a:rPr lang="de-AT" smtClean="0"/>
-              <a:t>02.01.2015</a:t>
+              <a:t>08.01.2015</a:t>
             </a:fld>
             <a:endParaRPr lang="de-AT"/>
           </a:p>
@@ -458,7 +458,7 @@
           <a:p>
             <a:fld id="{AC60435C-27D0-4975-B58B-066C710F2018}" type="datetimeFigureOut">
               <a:rPr lang="de-AT" smtClean="0"/>
-              <a:t>02.01.2015</a:t>
+              <a:t>08.01.2015</a:t>
             </a:fld>
             <a:endParaRPr lang="de-AT"/>
           </a:p>
@@ -638,7 +638,7 @@
           <a:p>
             <a:fld id="{AC60435C-27D0-4975-B58B-066C710F2018}" type="datetimeFigureOut">
               <a:rPr lang="de-AT" smtClean="0"/>
-              <a:t>02.01.2015</a:t>
+              <a:t>08.01.2015</a:t>
             </a:fld>
             <a:endParaRPr lang="de-AT"/>
           </a:p>
@@ -808,7 +808,7 @@
           <a:p>
             <a:fld id="{AC60435C-27D0-4975-B58B-066C710F2018}" type="datetimeFigureOut">
               <a:rPr lang="de-AT" smtClean="0"/>
-              <a:t>02.01.2015</a:t>
+              <a:t>08.01.2015</a:t>
             </a:fld>
             <a:endParaRPr lang="de-AT"/>
           </a:p>
@@ -1054,7 +1054,7 @@
           <a:p>
             <a:fld id="{AC60435C-27D0-4975-B58B-066C710F2018}" type="datetimeFigureOut">
               <a:rPr lang="de-AT" smtClean="0"/>
-              <a:t>02.01.2015</a:t>
+              <a:t>08.01.2015</a:t>
             </a:fld>
             <a:endParaRPr lang="de-AT"/>
           </a:p>
@@ -1342,7 +1342,7 @@
           <a:p>
             <a:fld id="{AC60435C-27D0-4975-B58B-066C710F2018}" type="datetimeFigureOut">
               <a:rPr lang="de-AT" smtClean="0"/>
-              <a:t>02.01.2015</a:t>
+              <a:t>08.01.2015</a:t>
             </a:fld>
             <a:endParaRPr lang="de-AT"/>
           </a:p>
@@ -1764,7 +1764,7 @@
           <a:p>
             <a:fld id="{AC60435C-27D0-4975-B58B-066C710F2018}" type="datetimeFigureOut">
               <a:rPr lang="de-AT" smtClean="0"/>
-              <a:t>02.01.2015</a:t>
+              <a:t>08.01.2015</a:t>
             </a:fld>
             <a:endParaRPr lang="de-AT"/>
           </a:p>
@@ -1882,7 +1882,7 @@
           <a:p>
             <a:fld id="{AC60435C-27D0-4975-B58B-066C710F2018}" type="datetimeFigureOut">
               <a:rPr lang="de-AT" smtClean="0"/>
-              <a:t>02.01.2015</a:t>
+              <a:t>08.01.2015</a:t>
             </a:fld>
             <a:endParaRPr lang="de-AT"/>
           </a:p>
@@ -1977,7 +1977,7 @@
           <a:p>
             <a:fld id="{AC60435C-27D0-4975-B58B-066C710F2018}" type="datetimeFigureOut">
               <a:rPr lang="de-AT" smtClean="0"/>
-              <a:t>02.01.2015</a:t>
+              <a:t>08.01.2015</a:t>
             </a:fld>
             <a:endParaRPr lang="de-AT"/>
           </a:p>
@@ -2254,7 +2254,7 @@
           <a:p>
             <a:fld id="{AC60435C-27D0-4975-B58B-066C710F2018}" type="datetimeFigureOut">
               <a:rPr lang="de-AT" smtClean="0"/>
-              <a:t>02.01.2015</a:t>
+              <a:t>08.01.2015</a:t>
             </a:fld>
             <a:endParaRPr lang="de-AT"/>
           </a:p>
@@ -2507,7 +2507,7 @@
           <a:p>
             <a:fld id="{AC60435C-27D0-4975-B58B-066C710F2018}" type="datetimeFigureOut">
               <a:rPr lang="de-AT" smtClean="0"/>
-              <a:t>02.01.2015</a:t>
+              <a:t>08.01.2015</a:t>
             </a:fld>
             <a:endParaRPr lang="de-AT"/>
           </a:p>
@@ -2720,7 +2720,7 @@
           <a:p>
             <a:fld id="{AC60435C-27D0-4975-B58B-066C710F2018}" type="datetimeFigureOut">
               <a:rPr lang="de-AT" smtClean="0"/>
-              <a:t>02.01.2015</a:t>
+              <a:t>08.01.2015</a:t>
             </a:fld>
             <a:endParaRPr lang="de-AT"/>
           </a:p>
@@ -3097,13 +3097,99 @@
       </p:grpSpPr>
       <p:sp>
         <p:nvSpPr>
-          <p:cNvPr id="4" name="Pfeil nach rechts 3"/>
+          <p:cNvPr id="12" name="Pfeil nach rechts 11"/>
           <p:cNvSpPr/>
           <p:nvPr/>
         </p:nvSpPr>
         <p:spPr>
+          <a:xfrm rot="16200000">
+            <a:off x="2483768" y="2348881"/>
+            <a:ext cx="144016" cy="144016"/>
+          </a:xfrm>
+          <a:prstGeom prst="rightArrow">
+            <a:avLst/>
+          </a:prstGeom>
+          <a:solidFill>
+            <a:schemeClr val="accent1"/>
+          </a:solidFill>
+        </p:spPr>
+        <p:style>
+          <a:lnRef idx="2">
+            <a:schemeClr val="accent1">
+              <a:shade val="50000"/>
+            </a:schemeClr>
+          </a:lnRef>
+          <a:fillRef idx="1">
+            <a:schemeClr val="accent1"/>
+          </a:fillRef>
+          <a:effectRef idx="0">
+            <a:schemeClr val="accent1"/>
+          </a:effectRef>
+          <a:fontRef idx="minor">
+            <a:schemeClr val="lt1"/>
+          </a:fontRef>
+        </p:style>
+        <p:txBody>
+          <a:bodyPr rtlCol="0" anchor="ctr"/>
+          <a:lstStyle/>
+          <a:p>
+            <a:pPr algn="ctr"/>
+            <a:endParaRPr lang="de-AT"/>
+          </a:p>
+        </p:txBody>
+      </p:sp>
+      <p:sp>
+        <p:nvSpPr>
+          <p:cNvPr id="13" name="Pfeil nach rechts 12"/>
+          <p:cNvSpPr/>
+          <p:nvPr/>
+        </p:nvSpPr>
+        <p:spPr>
           <a:xfrm rot="5400000">
-            <a:off x="1403648" y="2636912"/>
+            <a:off x="2292127" y="2348881"/>
+            <a:ext cx="144016" cy="144016"/>
+          </a:xfrm>
+          <a:prstGeom prst="rightArrow">
+            <a:avLst/>
+          </a:prstGeom>
+          <a:solidFill>
+            <a:schemeClr val="accent1"/>
+          </a:solidFill>
+        </p:spPr>
+        <p:style>
+          <a:lnRef idx="2">
+            <a:schemeClr val="accent1">
+              <a:shade val="50000"/>
+            </a:schemeClr>
+          </a:lnRef>
+          <a:fillRef idx="1">
+            <a:schemeClr val="accent1"/>
+          </a:fillRef>
+          <a:effectRef idx="0">
+            <a:schemeClr val="accent1"/>
+          </a:effectRef>
+          <a:fontRef idx="minor">
+            <a:schemeClr val="lt1"/>
+          </a:fontRef>
+        </p:style>
+        <p:txBody>
+          <a:bodyPr rtlCol="0" anchor="ctr"/>
+          <a:lstStyle/>
+          <a:p>
+            <a:pPr algn="ctr"/>
+            <a:endParaRPr lang="de-AT"/>
+          </a:p>
+        </p:txBody>
+      </p:sp>
+      <p:sp>
+        <p:nvSpPr>
+          <p:cNvPr id="14" name="Pfeil nach rechts 13"/>
+          <p:cNvSpPr/>
+          <p:nvPr/>
+        </p:nvSpPr>
+        <p:spPr>
+          <a:xfrm rot="16200000">
+            <a:off x="2483768" y="2573288"/>
             <a:ext cx="144016" cy="144016"/>
           </a:xfrm>
           <a:prstGeom prst="rightArrow">
@@ -3138,13 +3224,13 @@
       </p:sp>
       <p:sp>
         <p:nvSpPr>
-          <p:cNvPr id="5" name="Pfeil nach rechts 4"/>
+          <p:cNvPr id="15" name="Pfeil nach rechts 14"/>
           <p:cNvSpPr/>
           <p:nvPr/>
         </p:nvSpPr>
         <p:spPr>
-          <a:xfrm rot="16200000">
-            <a:off x="1619672" y="2628031"/>
+          <a:xfrm rot="5400000">
+            <a:off x="2292127" y="2573288"/>
             <a:ext cx="144016" cy="144016"/>
           </a:xfrm>
           <a:prstGeom prst="rightArrow">
@@ -3179,53 +3265,13 @@
       </p:sp>
       <p:sp>
         <p:nvSpPr>
-          <p:cNvPr id="6" name="Pfeil nach rechts 5"/>
+          <p:cNvPr id="16" name="Pfeil nach rechts 15"/>
           <p:cNvSpPr/>
           <p:nvPr/>
         </p:nvSpPr>
         <p:spPr>
-          <a:xfrm rot="5400000">
-            <a:off x="1403053" y="2933825"/>
-            <a:ext cx="144016" cy="144016"/>
-          </a:xfrm>
-          <a:prstGeom prst="rightArrow">
-            <a:avLst/>
-          </a:prstGeom>
-        </p:spPr>
-        <p:style>
-          <a:lnRef idx="2">
-            <a:schemeClr val="accent1">
-              <a:shade val="50000"/>
-            </a:schemeClr>
-          </a:lnRef>
-          <a:fillRef idx="1">
-            <a:schemeClr val="accent1"/>
-          </a:fillRef>
-          <a:effectRef idx="0">
-            <a:schemeClr val="accent1"/>
-          </a:effectRef>
-          <a:fontRef idx="minor">
-            <a:schemeClr val="lt1"/>
-          </a:fontRef>
-        </p:style>
-        <p:txBody>
-          <a:bodyPr rtlCol="0" anchor="ctr"/>
-          <a:lstStyle/>
-          <a:p>
-            <a:pPr algn="ctr"/>
-            <a:endParaRPr lang="de-AT"/>
-          </a:p>
-        </p:txBody>
-      </p:sp>
-      <p:sp>
-        <p:nvSpPr>
-          <p:cNvPr id="7" name="Pfeil nach rechts 6"/>
-          <p:cNvSpPr/>
-          <p:nvPr/>
-        </p:nvSpPr>
-        <p:spPr>
           <a:xfrm rot="16200000">
-            <a:off x="1619077" y="2924944"/>
+            <a:off x="2483768" y="2786535"/>
             <a:ext cx="144016" cy="144016"/>
           </a:xfrm>
           <a:prstGeom prst="rightArrow">
@@ -3260,18 +3306,21 @@
       </p:sp>
       <p:sp>
         <p:nvSpPr>
-          <p:cNvPr id="8" name="Pfeil nach rechts 7"/>
+          <p:cNvPr id="17" name="Pfeil nach rechts 16"/>
           <p:cNvSpPr/>
           <p:nvPr/>
         </p:nvSpPr>
         <p:spPr>
           <a:xfrm rot="5400000">
-            <a:off x="1402458" y="2357761"/>
+            <a:off x="2292127" y="2786535"/>
             <a:ext cx="144016" cy="144016"/>
           </a:xfrm>
           <a:prstGeom prst="rightArrow">
             <a:avLst/>
           </a:prstGeom>
+          <a:solidFill>
+            <a:schemeClr val="accent1"/>
+          </a:solidFill>
         </p:spPr>
         <p:style>
           <a:lnRef idx="2">
@@ -3300,18 +3349,21 @@
       </p:sp>
       <p:sp>
         <p:nvSpPr>
-          <p:cNvPr id="9" name="Pfeil nach rechts 8"/>
+          <p:cNvPr id="18" name="Pfeil nach rechts 17"/>
           <p:cNvSpPr/>
           <p:nvPr/>
         </p:nvSpPr>
         <p:spPr>
           <a:xfrm rot="16200000">
-            <a:off x="1618482" y="2348880"/>
+            <a:off x="2483768" y="3010942"/>
             <a:ext cx="144016" cy="144016"/>
           </a:xfrm>
           <a:prstGeom prst="rightArrow">
             <a:avLst/>
           </a:prstGeom>
+          <a:solidFill>
+            <a:schemeClr val="accent1"/>
+          </a:solidFill>
         </p:spPr>
         <p:style>
           <a:lnRef idx="2">
@@ -3340,59 +3392,19 @@
       </p:sp>
       <p:sp>
         <p:nvSpPr>
-          <p:cNvPr id="10" name="Pfeil nach rechts 9"/>
+          <p:cNvPr id="19" name="Pfeil nach rechts 18"/>
           <p:cNvSpPr/>
           <p:nvPr/>
         </p:nvSpPr>
         <p:spPr>
           <a:xfrm rot="5400000">
-            <a:off x="1401863" y="3158730"/>
+            <a:off x="2292127" y="3010942"/>
             <a:ext cx="144016" cy="144016"/>
           </a:xfrm>
           <a:prstGeom prst="rightArrow">
             <a:avLst/>
           </a:prstGeom>
           <a:noFill/>
-        </p:spPr>
-        <p:style>
-          <a:lnRef idx="2">
-            <a:schemeClr val="accent1">
-              <a:shade val="50000"/>
-            </a:schemeClr>
-          </a:lnRef>
-          <a:fillRef idx="1">
-            <a:schemeClr val="accent1"/>
-          </a:fillRef>
-          <a:effectRef idx="0">
-            <a:schemeClr val="accent1"/>
-          </a:effectRef>
-          <a:fontRef idx="minor">
-            <a:schemeClr val="lt1"/>
-          </a:fontRef>
-        </p:style>
-        <p:txBody>
-          <a:bodyPr rtlCol="0" anchor="ctr"/>
-          <a:lstStyle/>
-          <a:p>
-            <a:pPr algn="ctr"/>
-            <a:endParaRPr lang="de-AT"/>
-          </a:p>
-        </p:txBody>
-      </p:sp>
-      <p:sp>
-        <p:nvSpPr>
-          <p:cNvPr id="11" name="Pfeil nach rechts 10"/>
-          <p:cNvSpPr/>
-          <p:nvPr/>
-        </p:nvSpPr>
-        <p:spPr>
-          <a:xfrm rot="16200000">
-            <a:off x="1617887" y="3149849"/>
-            <a:ext cx="144016" cy="144016"/>
-          </a:xfrm>
-          <a:prstGeom prst="rightArrow">
-            <a:avLst/>
-          </a:prstGeom>
         </p:spPr>
         <p:style>
           <a:lnRef idx="2">

</xml_diff>